<commit_message>
Añadido RSS a Power Point de XML.
Añadido Story1 sobre RSS de la segunda parte de XML en el Power Point.
</commit_message>
<xml_diff>
--- a/xml/PARTE 1 - STORY 01 Y 02 - XML.pptx
+++ b/xml/PARTE 1 - STORY 01 Y 02 - XML.pptx
@@ -5,7 +5,7 @@
     <p:sldMasterId id="2147483657" r:id="rId1"/>
   </p:sldMasterIdLst>
   <p:notesMasterIdLst>
-    <p:notesMasterId r:id="rId9"/>
+    <p:notesMasterId r:id="rId15"/>
   </p:notesMasterIdLst>
   <p:sldIdLst>
     <p:sldId id="256" r:id="rId2"/>
@@ -15,30 +15,36 @@
     <p:sldId id="258" r:id="rId6"/>
     <p:sldId id="257" r:id="rId7"/>
     <p:sldId id="259" r:id="rId8"/>
+    <p:sldId id="266" r:id="rId9"/>
+    <p:sldId id="267" r:id="rId10"/>
+    <p:sldId id="268" r:id="rId11"/>
+    <p:sldId id="269" r:id="rId12"/>
+    <p:sldId id="270" r:id="rId13"/>
+    <p:sldId id="271" r:id="rId14"/>
   </p:sldIdLst>
   <p:sldSz cx="9144000" cy="5143500" type="screen16x9"/>
   <p:notesSz cx="6858000" cy="9144000"/>
   <p:embeddedFontLst>
     <p:embeddedFont>
       <p:font typeface="Calibri" panose="020F0502020204030204" pitchFamily="34" charset="0"/>
-      <p:regular r:id="rId10"/>
-      <p:bold r:id="rId11"/>
-      <p:italic r:id="rId12"/>
-      <p:boldItalic r:id="rId13"/>
+      <p:regular r:id="rId16"/>
+      <p:bold r:id="rId17"/>
+      <p:italic r:id="rId18"/>
+      <p:boldItalic r:id="rId19"/>
     </p:embeddedFont>
     <p:embeddedFont>
       <p:font typeface="Consolas" panose="020B0609020204030204" pitchFamily="49" charset="0"/>
-      <p:regular r:id="rId14"/>
-      <p:bold r:id="rId15"/>
-      <p:italic r:id="rId16"/>
-      <p:boldItalic r:id="rId17"/>
+      <p:regular r:id="rId20"/>
+      <p:bold r:id="rId21"/>
+      <p:italic r:id="rId22"/>
+      <p:boldItalic r:id="rId23"/>
     </p:embeddedFont>
     <p:embeddedFont>
       <p:font typeface="Cousine" panose="020B0604020202020204" charset="0"/>
-      <p:regular r:id="rId18"/>
-      <p:bold r:id="rId19"/>
-      <p:italic r:id="rId20"/>
-      <p:boldItalic r:id="rId21"/>
+      <p:regular r:id="rId24"/>
+      <p:bold r:id="rId25"/>
+      <p:italic r:id="rId26"/>
+      <p:boldItalic r:id="rId27"/>
     </p:embeddedFont>
   </p:embeddedFontLst>
   <p:defaultTextStyle>
@@ -314,7 +320,7 @@
         <pc:chgData name="Iván Aurelio Márquez Morales" userId="S::ivanaurelio.s258702@cesurformacion.com::5b6f4333-6cef-4b64-be25-4d7145c070cf" providerId="AD" clId="Web-{EB916C9A-E81B-132E-F982-23CE3C2CF077}" dt="2022-01-26T12:03:02.174" v="12"/>
         <pc:sldMkLst>
           <pc:docMk/>
-          <pc:sldMk cId="0" sldId="257"/>
+          <pc:sldMk cId="1546714283" sldId="257"/>
         </pc:sldMkLst>
       </pc:sldChg>
       <pc:sldChg chg="modSp ord">
@@ -1129,6 +1135,660 @@
 </p:notes>
 </file>
 
+<file path=ppt/notesSlides/notesSlide4.xml><?xml version="1.0" encoding="utf-8"?>
+<p:notes xmlns:a="http://schemas.openxmlformats.org/drawingml/2006/main" xmlns:r="http://schemas.openxmlformats.org/officeDocument/2006/relationships" xmlns:p="http://schemas.openxmlformats.org/presentationml/2006/main" showMasterSp="0" showMasterPhAnim="0">
+  <p:cSld>
+    <p:spTree>
+      <p:nvGrpSpPr>
+        <p:cNvPr id="1" name="Shape 61"/>
+        <p:cNvGrpSpPr/>
+        <p:nvPr/>
+      </p:nvGrpSpPr>
+      <p:grpSpPr>
+        <a:xfrm>
+          <a:off x="0" y="0"/>
+          <a:ext cx="0" cy="0"/>
+          <a:chOff x="0" y="0"/>
+          <a:chExt cx="0" cy="0"/>
+        </a:xfrm>
+      </p:grpSpPr>
+      <p:sp>
+        <p:nvSpPr>
+          <p:cNvPr id="62" name="Google Shape;62;g35f391192_00:notes"/>
+          <p:cNvSpPr>
+            <a:spLocks noGrp="1" noRot="1" noChangeAspect="1"/>
+          </p:cNvSpPr>
+          <p:nvPr>
+            <p:ph type="sldImg" idx="2"/>
+          </p:nvPr>
+        </p:nvSpPr>
+        <p:spPr>
+          <a:xfrm>
+            <a:off x="381000" y="685800"/>
+            <a:ext cx="6096000" cy="3429000"/>
+          </a:xfrm>
+          <a:custGeom>
+            <a:avLst/>
+            <a:gdLst/>
+            <a:ahLst/>
+            <a:cxnLst/>
+            <a:rect l="l" t="t" r="r" b="b"/>
+            <a:pathLst>
+              <a:path w="120000" h="120000" extrusionOk="0">
+                <a:moveTo>
+                  <a:pt x="0" y="0"/>
+                </a:moveTo>
+                <a:lnTo>
+                  <a:pt x="120000" y="0"/>
+                </a:lnTo>
+                <a:lnTo>
+                  <a:pt x="120000" y="120000"/>
+                </a:lnTo>
+                <a:lnTo>
+                  <a:pt x="0" y="120000"/>
+                </a:lnTo>
+                <a:close/>
+              </a:path>
+            </a:pathLst>
+          </a:custGeom>
+        </p:spPr>
+      </p:sp>
+      <p:sp>
+        <p:nvSpPr>
+          <p:cNvPr id="63" name="Google Shape;63;g35f391192_00:notes"/>
+          <p:cNvSpPr txBox="1">
+            <a:spLocks noGrp="1"/>
+          </p:cNvSpPr>
+          <p:nvPr>
+            <p:ph type="body" idx="1"/>
+          </p:nvPr>
+        </p:nvSpPr>
+        <p:spPr>
+          <a:xfrm>
+            <a:off x="685800" y="4343400"/>
+            <a:ext cx="5486400" cy="4114800"/>
+          </a:xfrm>
+          <a:prstGeom prst="rect">
+            <a:avLst/>
+          </a:prstGeom>
+        </p:spPr>
+        <p:txBody>
+          <a:bodyPr spcFirstLastPara="1" wrap="square" lIns="91425" tIns="91425" rIns="91425" bIns="91425" anchor="t" anchorCtr="0">
+            <a:noAutofit/>
+          </a:bodyPr>
+          <a:lstStyle/>
+          <a:p>
+            <a:pPr marL="0" lvl="0" indent="0" algn="l" rtl="0">
+              <a:spcBef>
+                <a:spcPts val="0"/>
+              </a:spcBef>
+              <a:spcAft>
+                <a:spcPts val="0"/>
+              </a:spcAft>
+              <a:buNone/>
+            </a:pPr>
+            <a:endParaRPr/>
+          </a:p>
+        </p:txBody>
+      </p:sp>
+    </p:spTree>
+    <p:extLst>
+      <p:ext uri="{BB962C8B-B14F-4D97-AF65-F5344CB8AC3E}">
+        <p14:creationId xmlns:p14="http://schemas.microsoft.com/office/powerpoint/2010/main" val="1676828168"/>
+      </p:ext>
+    </p:extLst>
+  </p:cSld>
+  <p:clrMapOvr>
+    <a:masterClrMapping/>
+  </p:clrMapOvr>
+</p:notes>
+</file>
+
+<file path=ppt/notesSlides/notesSlide5.xml><?xml version="1.0" encoding="utf-8"?>
+<p:notes xmlns:a="http://schemas.openxmlformats.org/drawingml/2006/main" xmlns:r="http://schemas.openxmlformats.org/officeDocument/2006/relationships" xmlns:p="http://schemas.openxmlformats.org/presentationml/2006/main" showMasterSp="0" showMasterPhAnim="0">
+  <p:cSld>
+    <p:spTree>
+      <p:nvGrpSpPr>
+        <p:cNvPr id="1" name="Shape 105"/>
+        <p:cNvGrpSpPr/>
+        <p:nvPr/>
+      </p:nvGrpSpPr>
+      <p:grpSpPr>
+        <a:xfrm>
+          <a:off x="0" y="0"/>
+          <a:ext cx="0" cy="0"/>
+          <a:chOff x="0" y="0"/>
+          <a:chExt cx="0" cy="0"/>
+        </a:xfrm>
+      </p:grpSpPr>
+      <p:sp>
+        <p:nvSpPr>
+          <p:cNvPr id="106" name="Google Shape;106;p:notes"/>
+          <p:cNvSpPr>
+            <a:spLocks noGrp="1" noRot="1" noChangeAspect="1"/>
+          </p:cNvSpPr>
+          <p:nvPr>
+            <p:ph type="sldImg" idx="2"/>
+          </p:nvPr>
+        </p:nvSpPr>
+        <p:spPr>
+          <a:xfrm>
+            <a:off x="381000" y="685800"/>
+            <a:ext cx="6096000" cy="3429000"/>
+          </a:xfrm>
+          <a:custGeom>
+            <a:avLst/>
+            <a:gdLst/>
+            <a:ahLst/>
+            <a:cxnLst/>
+            <a:rect l="l" t="t" r="r" b="b"/>
+            <a:pathLst>
+              <a:path w="120000" h="120000" extrusionOk="0">
+                <a:moveTo>
+                  <a:pt x="0" y="0"/>
+                </a:moveTo>
+                <a:lnTo>
+                  <a:pt x="120000" y="0"/>
+                </a:lnTo>
+                <a:lnTo>
+                  <a:pt x="120000" y="120000"/>
+                </a:lnTo>
+                <a:lnTo>
+                  <a:pt x="0" y="120000"/>
+                </a:lnTo>
+                <a:close/>
+              </a:path>
+            </a:pathLst>
+          </a:custGeom>
+        </p:spPr>
+      </p:sp>
+      <p:sp>
+        <p:nvSpPr>
+          <p:cNvPr id="107" name="Google Shape;107;p:notes"/>
+          <p:cNvSpPr txBox="1">
+            <a:spLocks noGrp="1"/>
+          </p:cNvSpPr>
+          <p:nvPr>
+            <p:ph type="body" idx="1"/>
+          </p:nvPr>
+        </p:nvSpPr>
+        <p:spPr>
+          <a:xfrm>
+            <a:off x="685800" y="4343400"/>
+            <a:ext cx="5486400" cy="4114800"/>
+          </a:xfrm>
+          <a:prstGeom prst="rect">
+            <a:avLst/>
+          </a:prstGeom>
+        </p:spPr>
+        <p:txBody>
+          <a:bodyPr spcFirstLastPara="1" wrap="square" lIns="91425" tIns="91425" rIns="91425" bIns="91425" anchor="t" anchorCtr="0">
+            <a:noAutofit/>
+          </a:bodyPr>
+          <a:lstStyle/>
+          <a:p>
+            <a:pPr marL="0" lvl="0" indent="0" algn="l" rtl="0">
+              <a:spcBef>
+                <a:spcPts val="0"/>
+              </a:spcBef>
+              <a:spcAft>
+                <a:spcPts val="0"/>
+              </a:spcAft>
+              <a:buNone/>
+            </a:pPr>
+            <a:endParaRPr/>
+          </a:p>
+        </p:txBody>
+      </p:sp>
+    </p:spTree>
+    <p:extLst>
+      <p:ext uri="{BB962C8B-B14F-4D97-AF65-F5344CB8AC3E}">
+        <p14:creationId xmlns:p14="http://schemas.microsoft.com/office/powerpoint/2010/main" val="2331812003"/>
+      </p:ext>
+    </p:extLst>
+  </p:cSld>
+  <p:clrMapOvr>
+    <a:masterClrMapping/>
+  </p:clrMapOvr>
+</p:notes>
+</file>
+
+<file path=ppt/notesSlides/notesSlide6.xml><?xml version="1.0" encoding="utf-8"?>
+<p:notes xmlns:a="http://schemas.openxmlformats.org/drawingml/2006/main" xmlns:r="http://schemas.openxmlformats.org/officeDocument/2006/relationships" xmlns:p="http://schemas.openxmlformats.org/presentationml/2006/main" showMasterSp="0" showMasterPhAnim="0">
+  <p:cSld>
+    <p:spTree>
+      <p:nvGrpSpPr>
+        <p:cNvPr id="1" name="Shape 105"/>
+        <p:cNvGrpSpPr/>
+        <p:nvPr/>
+      </p:nvGrpSpPr>
+      <p:grpSpPr>
+        <a:xfrm>
+          <a:off x="0" y="0"/>
+          <a:ext cx="0" cy="0"/>
+          <a:chOff x="0" y="0"/>
+          <a:chExt cx="0" cy="0"/>
+        </a:xfrm>
+      </p:grpSpPr>
+      <p:sp>
+        <p:nvSpPr>
+          <p:cNvPr id="106" name="Google Shape;106;p:notes"/>
+          <p:cNvSpPr>
+            <a:spLocks noGrp="1" noRot="1" noChangeAspect="1"/>
+          </p:cNvSpPr>
+          <p:nvPr>
+            <p:ph type="sldImg" idx="2"/>
+          </p:nvPr>
+        </p:nvSpPr>
+        <p:spPr>
+          <a:xfrm>
+            <a:off x="381000" y="685800"/>
+            <a:ext cx="6096000" cy="3429000"/>
+          </a:xfrm>
+          <a:custGeom>
+            <a:avLst/>
+            <a:gdLst/>
+            <a:ahLst/>
+            <a:cxnLst/>
+            <a:rect l="l" t="t" r="r" b="b"/>
+            <a:pathLst>
+              <a:path w="120000" h="120000" extrusionOk="0">
+                <a:moveTo>
+                  <a:pt x="0" y="0"/>
+                </a:moveTo>
+                <a:lnTo>
+                  <a:pt x="120000" y="0"/>
+                </a:lnTo>
+                <a:lnTo>
+                  <a:pt x="120000" y="120000"/>
+                </a:lnTo>
+                <a:lnTo>
+                  <a:pt x="0" y="120000"/>
+                </a:lnTo>
+                <a:close/>
+              </a:path>
+            </a:pathLst>
+          </a:custGeom>
+        </p:spPr>
+      </p:sp>
+      <p:sp>
+        <p:nvSpPr>
+          <p:cNvPr id="107" name="Google Shape;107;p:notes"/>
+          <p:cNvSpPr txBox="1">
+            <a:spLocks noGrp="1"/>
+          </p:cNvSpPr>
+          <p:nvPr>
+            <p:ph type="body" idx="1"/>
+          </p:nvPr>
+        </p:nvSpPr>
+        <p:spPr>
+          <a:xfrm>
+            <a:off x="685800" y="4343400"/>
+            <a:ext cx="5486400" cy="4114800"/>
+          </a:xfrm>
+          <a:prstGeom prst="rect">
+            <a:avLst/>
+          </a:prstGeom>
+        </p:spPr>
+        <p:txBody>
+          <a:bodyPr spcFirstLastPara="1" wrap="square" lIns="91425" tIns="91425" rIns="91425" bIns="91425" anchor="t" anchorCtr="0">
+            <a:noAutofit/>
+          </a:bodyPr>
+          <a:lstStyle/>
+          <a:p>
+            <a:pPr marL="0" lvl="0" indent="0" algn="l" rtl="0">
+              <a:spcBef>
+                <a:spcPts val="0"/>
+              </a:spcBef>
+              <a:spcAft>
+                <a:spcPts val="0"/>
+              </a:spcAft>
+              <a:buNone/>
+            </a:pPr>
+            <a:endParaRPr/>
+          </a:p>
+        </p:txBody>
+      </p:sp>
+    </p:spTree>
+    <p:extLst>
+      <p:ext uri="{BB962C8B-B14F-4D97-AF65-F5344CB8AC3E}">
+        <p14:creationId xmlns:p14="http://schemas.microsoft.com/office/powerpoint/2010/main" val="2106646068"/>
+      </p:ext>
+    </p:extLst>
+  </p:cSld>
+  <p:clrMapOvr>
+    <a:masterClrMapping/>
+  </p:clrMapOvr>
+</p:notes>
+</file>
+
+<file path=ppt/notesSlides/notesSlide7.xml><?xml version="1.0" encoding="utf-8"?>
+<p:notes xmlns:a="http://schemas.openxmlformats.org/drawingml/2006/main" xmlns:r="http://schemas.openxmlformats.org/officeDocument/2006/relationships" xmlns:p="http://schemas.openxmlformats.org/presentationml/2006/main" showMasterSp="0" showMasterPhAnim="0">
+  <p:cSld>
+    <p:spTree>
+      <p:nvGrpSpPr>
+        <p:cNvPr id="1" name="Shape 105"/>
+        <p:cNvGrpSpPr/>
+        <p:nvPr/>
+      </p:nvGrpSpPr>
+      <p:grpSpPr>
+        <a:xfrm>
+          <a:off x="0" y="0"/>
+          <a:ext cx="0" cy="0"/>
+          <a:chOff x="0" y="0"/>
+          <a:chExt cx="0" cy="0"/>
+        </a:xfrm>
+      </p:grpSpPr>
+      <p:sp>
+        <p:nvSpPr>
+          <p:cNvPr id="106" name="Google Shape;106;p:notes"/>
+          <p:cNvSpPr>
+            <a:spLocks noGrp="1" noRot="1" noChangeAspect="1"/>
+          </p:cNvSpPr>
+          <p:nvPr>
+            <p:ph type="sldImg" idx="2"/>
+          </p:nvPr>
+        </p:nvSpPr>
+        <p:spPr>
+          <a:xfrm>
+            <a:off x="381000" y="685800"/>
+            <a:ext cx="6096000" cy="3429000"/>
+          </a:xfrm>
+          <a:custGeom>
+            <a:avLst/>
+            <a:gdLst/>
+            <a:ahLst/>
+            <a:cxnLst/>
+            <a:rect l="l" t="t" r="r" b="b"/>
+            <a:pathLst>
+              <a:path w="120000" h="120000" extrusionOk="0">
+                <a:moveTo>
+                  <a:pt x="0" y="0"/>
+                </a:moveTo>
+                <a:lnTo>
+                  <a:pt x="120000" y="0"/>
+                </a:lnTo>
+                <a:lnTo>
+                  <a:pt x="120000" y="120000"/>
+                </a:lnTo>
+                <a:lnTo>
+                  <a:pt x="0" y="120000"/>
+                </a:lnTo>
+                <a:close/>
+              </a:path>
+            </a:pathLst>
+          </a:custGeom>
+        </p:spPr>
+      </p:sp>
+      <p:sp>
+        <p:nvSpPr>
+          <p:cNvPr id="107" name="Google Shape;107;p:notes"/>
+          <p:cNvSpPr txBox="1">
+            <a:spLocks noGrp="1"/>
+          </p:cNvSpPr>
+          <p:nvPr>
+            <p:ph type="body" idx="1"/>
+          </p:nvPr>
+        </p:nvSpPr>
+        <p:spPr>
+          <a:xfrm>
+            <a:off x="685800" y="4343400"/>
+            <a:ext cx="5486400" cy="4114800"/>
+          </a:xfrm>
+          <a:prstGeom prst="rect">
+            <a:avLst/>
+          </a:prstGeom>
+        </p:spPr>
+        <p:txBody>
+          <a:bodyPr spcFirstLastPara="1" wrap="square" lIns="91425" tIns="91425" rIns="91425" bIns="91425" anchor="t" anchorCtr="0">
+            <a:noAutofit/>
+          </a:bodyPr>
+          <a:lstStyle/>
+          <a:p>
+            <a:pPr marL="0" lvl="0" indent="0" algn="l" rtl="0">
+              <a:spcBef>
+                <a:spcPts val="0"/>
+              </a:spcBef>
+              <a:spcAft>
+                <a:spcPts val="0"/>
+              </a:spcAft>
+              <a:buNone/>
+            </a:pPr>
+            <a:endParaRPr dirty="0"/>
+          </a:p>
+        </p:txBody>
+      </p:sp>
+    </p:spTree>
+    <p:extLst>
+      <p:ext uri="{BB962C8B-B14F-4D97-AF65-F5344CB8AC3E}">
+        <p14:creationId xmlns:p14="http://schemas.microsoft.com/office/powerpoint/2010/main" val="1428729857"/>
+      </p:ext>
+    </p:extLst>
+  </p:cSld>
+  <p:clrMapOvr>
+    <a:masterClrMapping/>
+  </p:clrMapOvr>
+</p:notes>
+</file>
+
+<file path=ppt/notesSlides/notesSlide8.xml><?xml version="1.0" encoding="utf-8"?>
+<p:notes xmlns:a="http://schemas.openxmlformats.org/drawingml/2006/main" xmlns:r="http://schemas.openxmlformats.org/officeDocument/2006/relationships" xmlns:p="http://schemas.openxmlformats.org/presentationml/2006/main" showMasterSp="0" showMasterPhAnim="0">
+  <p:cSld>
+    <p:spTree>
+      <p:nvGrpSpPr>
+        <p:cNvPr id="1" name="Shape 105"/>
+        <p:cNvGrpSpPr/>
+        <p:nvPr/>
+      </p:nvGrpSpPr>
+      <p:grpSpPr>
+        <a:xfrm>
+          <a:off x="0" y="0"/>
+          <a:ext cx="0" cy="0"/>
+          <a:chOff x="0" y="0"/>
+          <a:chExt cx="0" cy="0"/>
+        </a:xfrm>
+      </p:grpSpPr>
+      <p:sp>
+        <p:nvSpPr>
+          <p:cNvPr id="106" name="Google Shape;106;p:notes"/>
+          <p:cNvSpPr>
+            <a:spLocks noGrp="1" noRot="1" noChangeAspect="1"/>
+          </p:cNvSpPr>
+          <p:nvPr>
+            <p:ph type="sldImg" idx="2"/>
+          </p:nvPr>
+        </p:nvSpPr>
+        <p:spPr>
+          <a:xfrm>
+            <a:off x="381000" y="685800"/>
+            <a:ext cx="6096000" cy="3429000"/>
+          </a:xfrm>
+          <a:custGeom>
+            <a:avLst/>
+            <a:gdLst/>
+            <a:ahLst/>
+            <a:cxnLst/>
+            <a:rect l="l" t="t" r="r" b="b"/>
+            <a:pathLst>
+              <a:path w="120000" h="120000" extrusionOk="0">
+                <a:moveTo>
+                  <a:pt x="0" y="0"/>
+                </a:moveTo>
+                <a:lnTo>
+                  <a:pt x="120000" y="0"/>
+                </a:lnTo>
+                <a:lnTo>
+                  <a:pt x="120000" y="120000"/>
+                </a:lnTo>
+                <a:lnTo>
+                  <a:pt x="0" y="120000"/>
+                </a:lnTo>
+                <a:close/>
+              </a:path>
+            </a:pathLst>
+          </a:custGeom>
+        </p:spPr>
+      </p:sp>
+      <p:sp>
+        <p:nvSpPr>
+          <p:cNvPr id="107" name="Google Shape;107;p:notes"/>
+          <p:cNvSpPr txBox="1">
+            <a:spLocks noGrp="1"/>
+          </p:cNvSpPr>
+          <p:nvPr>
+            <p:ph type="body" idx="1"/>
+          </p:nvPr>
+        </p:nvSpPr>
+        <p:spPr>
+          <a:xfrm>
+            <a:off x="685800" y="4343400"/>
+            <a:ext cx="5486400" cy="4114800"/>
+          </a:xfrm>
+          <a:prstGeom prst="rect">
+            <a:avLst/>
+          </a:prstGeom>
+        </p:spPr>
+        <p:txBody>
+          <a:bodyPr spcFirstLastPara="1" wrap="square" lIns="91425" tIns="91425" rIns="91425" bIns="91425" anchor="t" anchorCtr="0">
+            <a:noAutofit/>
+          </a:bodyPr>
+          <a:lstStyle/>
+          <a:p>
+            <a:pPr marL="0" lvl="0" indent="0" algn="l" rtl="0">
+              <a:spcBef>
+                <a:spcPts val="0"/>
+              </a:spcBef>
+              <a:spcAft>
+                <a:spcPts val="0"/>
+              </a:spcAft>
+              <a:buNone/>
+            </a:pPr>
+            <a:endParaRPr dirty="0"/>
+          </a:p>
+        </p:txBody>
+      </p:sp>
+    </p:spTree>
+    <p:extLst>
+      <p:ext uri="{BB962C8B-B14F-4D97-AF65-F5344CB8AC3E}">
+        <p14:creationId xmlns:p14="http://schemas.microsoft.com/office/powerpoint/2010/main" val="861480775"/>
+      </p:ext>
+    </p:extLst>
+  </p:cSld>
+  <p:clrMapOvr>
+    <a:masterClrMapping/>
+  </p:clrMapOvr>
+</p:notes>
+</file>
+
+<file path=ppt/notesSlides/notesSlide9.xml><?xml version="1.0" encoding="utf-8"?>
+<p:notes xmlns:a="http://schemas.openxmlformats.org/drawingml/2006/main" xmlns:r="http://schemas.openxmlformats.org/officeDocument/2006/relationships" xmlns:p="http://schemas.openxmlformats.org/presentationml/2006/main" showMasterSp="0" showMasterPhAnim="0">
+  <p:cSld>
+    <p:spTree>
+      <p:nvGrpSpPr>
+        <p:cNvPr id="1" name="Shape 105"/>
+        <p:cNvGrpSpPr/>
+        <p:nvPr/>
+      </p:nvGrpSpPr>
+      <p:grpSpPr>
+        <a:xfrm>
+          <a:off x="0" y="0"/>
+          <a:ext cx="0" cy="0"/>
+          <a:chOff x="0" y="0"/>
+          <a:chExt cx="0" cy="0"/>
+        </a:xfrm>
+      </p:grpSpPr>
+      <p:sp>
+        <p:nvSpPr>
+          <p:cNvPr id="106" name="Google Shape;106;p:notes"/>
+          <p:cNvSpPr>
+            <a:spLocks noGrp="1" noRot="1" noChangeAspect="1"/>
+          </p:cNvSpPr>
+          <p:nvPr>
+            <p:ph type="sldImg" idx="2"/>
+          </p:nvPr>
+        </p:nvSpPr>
+        <p:spPr>
+          <a:xfrm>
+            <a:off x="381000" y="685800"/>
+            <a:ext cx="6096000" cy="3429000"/>
+          </a:xfrm>
+          <a:custGeom>
+            <a:avLst/>
+            <a:gdLst/>
+            <a:ahLst/>
+            <a:cxnLst/>
+            <a:rect l="l" t="t" r="r" b="b"/>
+            <a:pathLst>
+              <a:path w="120000" h="120000" extrusionOk="0">
+                <a:moveTo>
+                  <a:pt x="0" y="0"/>
+                </a:moveTo>
+                <a:lnTo>
+                  <a:pt x="120000" y="0"/>
+                </a:lnTo>
+                <a:lnTo>
+                  <a:pt x="120000" y="120000"/>
+                </a:lnTo>
+                <a:lnTo>
+                  <a:pt x="0" y="120000"/>
+                </a:lnTo>
+                <a:close/>
+              </a:path>
+            </a:pathLst>
+          </a:custGeom>
+        </p:spPr>
+      </p:sp>
+      <p:sp>
+        <p:nvSpPr>
+          <p:cNvPr id="107" name="Google Shape;107;p:notes"/>
+          <p:cNvSpPr txBox="1">
+            <a:spLocks noGrp="1"/>
+          </p:cNvSpPr>
+          <p:nvPr>
+            <p:ph type="body" idx="1"/>
+          </p:nvPr>
+        </p:nvSpPr>
+        <p:spPr>
+          <a:xfrm>
+            <a:off x="685800" y="4343400"/>
+            <a:ext cx="5486400" cy="4114800"/>
+          </a:xfrm>
+          <a:prstGeom prst="rect">
+            <a:avLst/>
+          </a:prstGeom>
+        </p:spPr>
+        <p:txBody>
+          <a:bodyPr spcFirstLastPara="1" wrap="square" lIns="91425" tIns="91425" rIns="91425" bIns="91425" anchor="t" anchorCtr="0">
+            <a:noAutofit/>
+          </a:bodyPr>
+          <a:lstStyle/>
+          <a:p>
+            <a:pPr marL="0" lvl="0" indent="0" algn="l" rtl="0">
+              <a:spcBef>
+                <a:spcPts val="0"/>
+              </a:spcBef>
+              <a:spcAft>
+                <a:spcPts val="0"/>
+              </a:spcAft>
+              <a:buNone/>
+            </a:pPr>
+            <a:endParaRPr dirty="0"/>
+          </a:p>
+        </p:txBody>
+      </p:sp>
+    </p:spTree>
+    <p:extLst>
+      <p:ext uri="{BB962C8B-B14F-4D97-AF65-F5344CB8AC3E}">
+        <p14:creationId xmlns:p14="http://schemas.microsoft.com/office/powerpoint/2010/main" val="2206728960"/>
+      </p:ext>
+    </p:extLst>
+  </p:cSld>
+  <p:clrMapOvr>
+    <a:masterClrMapping/>
+  </p:clrMapOvr>
+</p:notes>
+</file>
+
 <file path=ppt/slideLayouts/slideLayout1.xml><?xml version="1.0" encoding="utf-8"?>
 <p:sldLayout xmlns:a="http://schemas.openxmlformats.org/drawingml/2006/main" xmlns:r="http://schemas.openxmlformats.org/officeDocument/2006/relationships" xmlns:p="http://schemas.openxmlformats.org/presentationml/2006/main" matchingName="Title" type="title">
   <p:cSld name="TITLE">
@@ -2477,7 +3137,7 @@
           <a:p>
             <a:fld id="{40771E8B-6CA5-40B2-8038-0E112F3DAC1C}" type="datetimeFigureOut">
               <a:rPr lang="es-ES" smtClean="0"/>
-              <a:t>01/02/2022</a:t>
+              <a:t>03/02/2022</a:t>
             </a:fld>
             <a:endParaRPr lang="es-ES"/>
           </a:p>
@@ -4021,12 +4681,1156 @@
           <a:p>
             <a:r>
               <a:rPr lang="en" dirty="0"/>
-              <a:t>¿QUE ES XML?</a:t>
+              <a:t>¿QUÉ ES XML?</a:t>
             </a:r>
           </a:p>
         </p:txBody>
       </p:sp>
     </p:spTree>
+  </p:cSld>
+  <p:clrMapOvr>
+    <a:masterClrMapping/>
+  </p:clrMapOvr>
+</p:sld>
+</file>
+
+<file path=ppt/slides/slide10.xml><?xml version="1.0" encoding="utf-8"?>
+<p:sld xmlns:a="http://schemas.openxmlformats.org/drawingml/2006/main" xmlns:r="http://schemas.openxmlformats.org/officeDocument/2006/relationships" xmlns:p="http://schemas.openxmlformats.org/presentationml/2006/main">
+  <p:cSld>
+    <p:spTree>
+      <p:nvGrpSpPr>
+        <p:cNvPr id="1" name="Shape 108"/>
+        <p:cNvGrpSpPr/>
+        <p:nvPr/>
+      </p:nvGrpSpPr>
+      <p:grpSpPr>
+        <a:xfrm>
+          <a:off x="0" y="0"/>
+          <a:ext cx="0" cy="0"/>
+          <a:chOff x="0" y="0"/>
+          <a:chExt cx="0" cy="0"/>
+        </a:xfrm>
+      </p:grpSpPr>
+      <p:sp>
+        <p:nvSpPr>
+          <p:cNvPr id="109" name="Google Shape;109;p16"/>
+          <p:cNvSpPr txBox="1">
+            <a:spLocks noGrp="1"/>
+          </p:cNvSpPr>
+          <p:nvPr>
+            <p:ph type="title"/>
+          </p:nvPr>
+        </p:nvSpPr>
+        <p:spPr>
+          <a:xfrm>
+            <a:off x="343225" y="210033"/>
+            <a:ext cx="8229600" cy="413400"/>
+          </a:xfrm>
+          <a:prstGeom prst="rect">
+            <a:avLst/>
+          </a:prstGeom>
+        </p:spPr>
+        <p:txBody>
+          <a:bodyPr spcFirstLastPara="1" wrap="square" lIns="91425" tIns="91425" rIns="91425" bIns="91425" anchor="t" anchorCtr="0">
+            <a:noAutofit/>
+          </a:bodyPr>
+          <a:lstStyle/>
+          <a:p>
+            <a:pPr marL="0" lvl="0" indent="0" algn="l" rtl="0">
+              <a:spcBef>
+                <a:spcPts val="0"/>
+              </a:spcBef>
+              <a:spcAft>
+                <a:spcPts val="0"/>
+              </a:spcAft>
+              <a:buNone/>
+            </a:pPr>
+            <a:r>
+              <a:rPr lang="en" sz="3200" dirty="0"/>
+              <a:t>¿Para qué se usa?</a:t>
+            </a:r>
+            <a:endParaRPr sz="3200" dirty="0"/>
+          </a:p>
+        </p:txBody>
+      </p:sp>
+      <p:sp>
+        <p:nvSpPr>
+          <p:cNvPr id="110" name="Google Shape;110;p16"/>
+          <p:cNvSpPr txBox="1">
+            <a:spLocks noGrp="1"/>
+          </p:cNvSpPr>
+          <p:nvPr>
+            <p:ph type="body" idx="1"/>
+          </p:nvPr>
+        </p:nvSpPr>
+        <p:spPr>
+          <a:xfrm>
+            <a:off x="343225" y="969016"/>
+            <a:ext cx="8641032" cy="3964451"/>
+          </a:xfrm>
+          <a:prstGeom prst="rect">
+            <a:avLst/>
+          </a:prstGeom>
+        </p:spPr>
+        <p:txBody>
+          <a:bodyPr spcFirstLastPara="1" wrap="square" lIns="91425" tIns="91425" rIns="91425" bIns="91425" anchor="t" anchorCtr="0">
+            <a:noAutofit/>
+          </a:bodyPr>
+          <a:lstStyle/>
+          <a:p>
+            <a:pPr marL="76200" indent="0">
+              <a:buNone/>
+            </a:pPr>
+            <a:r>
+              <a:rPr lang="es-ES" b="0" i="0" dirty="0">
+                <a:solidFill>
+                  <a:srgbClr val="000000"/>
+                </a:solidFill>
+                <a:effectLst/>
+                <a:latin typeface="Times New Roman" panose="02020603050405020304" pitchFamily="18" charset="0"/>
+              </a:rPr>
+              <a:t>El alimentador RSS facilita la gestión y publicación de información y noticia en sitios y blogs. RSS es una forma estandarizada de distribución de la información de las páginas web a los lectores de las páginas. Esta información se distribuye a través de las fuentes RSS o Canales RSS. Gracias al RSS, los lectores pasan a tener una herramienta útil para mantenerse informado sobre las noticias y webs que le resultan de interés, conservando y almacenando toda la información en un solo lugar que se actualiza de manera automática.</a:t>
+            </a:r>
+            <a:endParaRPr lang="en" dirty="0"/>
+          </a:p>
+        </p:txBody>
+      </p:sp>
+      <p:sp>
+        <p:nvSpPr>
+          <p:cNvPr id="111" name="Google Shape;111;p16"/>
+          <p:cNvSpPr txBox="1">
+            <a:spLocks noGrp="1"/>
+          </p:cNvSpPr>
+          <p:nvPr>
+            <p:ph type="sldNum" idx="12"/>
+          </p:nvPr>
+        </p:nvSpPr>
+        <p:spPr>
+          <a:prstGeom prst="rect">
+            <a:avLst/>
+          </a:prstGeom>
+        </p:spPr>
+        <p:txBody>
+          <a:bodyPr spcFirstLastPara="1" wrap="square" lIns="91425" tIns="91425" rIns="91425" bIns="91425" anchor="t" anchorCtr="0">
+            <a:noAutofit/>
+          </a:bodyPr>
+          <a:lstStyle/>
+          <a:p>
+            <a:pPr marL="0" lvl="0" indent="0" algn="r" rtl="0">
+              <a:spcBef>
+                <a:spcPts val="0"/>
+              </a:spcBef>
+              <a:spcAft>
+                <a:spcPts val="0"/>
+              </a:spcAft>
+              <a:buNone/>
+            </a:pPr>
+            <a:fld id="{00000000-1234-1234-1234-123412341234}" type="slidenum">
+              <a:rPr lang="en"/>
+              <a:t>10</a:t>
+            </a:fld>
+            <a:endParaRPr/>
+          </a:p>
+        </p:txBody>
+      </p:sp>
+    </p:spTree>
+    <p:extLst>
+      <p:ext uri="{BB962C8B-B14F-4D97-AF65-F5344CB8AC3E}">
+        <p14:creationId xmlns:p14="http://schemas.microsoft.com/office/powerpoint/2010/main" val="2978467334"/>
+      </p:ext>
+    </p:extLst>
+  </p:cSld>
+  <p:clrMapOvr>
+    <a:masterClrMapping/>
+  </p:clrMapOvr>
+</p:sld>
+</file>
+
+<file path=ppt/slides/slide11.xml><?xml version="1.0" encoding="utf-8"?>
+<p:sld xmlns:a="http://schemas.openxmlformats.org/drawingml/2006/main" xmlns:r="http://schemas.openxmlformats.org/officeDocument/2006/relationships" xmlns:p="http://schemas.openxmlformats.org/presentationml/2006/main">
+  <p:cSld>
+    <p:spTree>
+      <p:nvGrpSpPr>
+        <p:cNvPr id="1" name="Shape 108"/>
+        <p:cNvGrpSpPr/>
+        <p:nvPr/>
+      </p:nvGrpSpPr>
+      <p:grpSpPr>
+        <a:xfrm>
+          <a:off x="0" y="0"/>
+          <a:ext cx="0" cy="0"/>
+          <a:chOff x="0" y="0"/>
+          <a:chExt cx="0" cy="0"/>
+        </a:xfrm>
+      </p:grpSpPr>
+      <p:sp>
+        <p:nvSpPr>
+          <p:cNvPr id="109" name="Google Shape;109;p16"/>
+          <p:cNvSpPr txBox="1">
+            <a:spLocks noGrp="1"/>
+          </p:cNvSpPr>
+          <p:nvPr>
+            <p:ph type="title"/>
+          </p:nvPr>
+        </p:nvSpPr>
+        <p:spPr>
+          <a:xfrm>
+            <a:off x="215585" y="146764"/>
+            <a:ext cx="8229600" cy="413400"/>
+          </a:xfrm>
+          <a:prstGeom prst="rect">
+            <a:avLst/>
+          </a:prstGeom>
+        </p:spPr>
+        <p:txBody>
+          <a:bodyPr spcFirstLastPara="1" wrap="square" lIns="91425" tIns="91425" rIns="91425" bIns="91425" anchor="t" anchorCtr="0">
+            <a:noAutofit/>
+          </a:bodyPr>
+          <a:lstStyle/>
+          <a:p>
+            <a:pPr marL="0" lvl="0" indent="0" algn="l" rtl="0">
+              <a:spcBef>
+                <a:spcPts val="0"/>
+              </a:spcBef>
+              <a:spcAft>
+                <a:spcPts val="0"/>
+              </a:spcAft>
+              <a:buNone/>
+            </a:pPr>
+            <a:r>
+              <a:rPr lang="en" sz="3200" dirty="0"/>
+              <a:t>Beneficios</a:t>
+            </a:r>
+            <a:endParaRPr sz="3200" dirty="0"/>
+          </a:p>
+        </p:txBody>
+      </p:sp>
+      <p:sp>
+        <p:nvSpPr>
+          <p:cNvPr id="110" name="Google Shape;110;p16"/>
+          <p:cNvSpPr txBox="1">
+            <a:spLocks noGrp="1"/>
+          </p:cNvSpPr>
+          <p:nvPr>
+            <p:ph type="body" idx="1"/>
+          </p:nvPr>
+        </p:nvSpPr>
+        <p:spPr>
+          <a:xfrm>
+            <a:off x="-298757" y="475735"/>
+            <a:ext cx="9052464" cy="3964451"/>
+          </a:xfrm>
+          <a:prstGeom prst="rect">
+            <a:avLst/>
+          </a:prstGeom>
+        </p:spPr>
+        <p:txBody>
+          <a:bodyPr spcFirstLastPara="1" wrap="square" lIns="91425" tIns="91425" rIns="91425" bIns="91425" anchor="t" anchorCtr="0">
+            <a:noAutofit/>
+          </a:bodyPr>
+          <a:lstStyle/>
+          <a:p>
+            <a:pPr algn="just"/>
+            <a:br>
+              <a:rPr lang="es-ES" sz="1400" b="0" i="0" dirty="0">
+                <a:solidFill>
+                  <a:srgbClr val="000000"/>
+                </a:solidFill>
+                <a:effectLst/>
+                <a:latin typeface="Times New Roman" panose="02020603050405020304" pitchFamily="18" charset="0"/>
+              </a:rPr>
+            </a:br>
+            <a:r>
+              <a:rPr lang="es-ES" sz="1600" b="0" i="0" dirty="0">
+                <a:solidFill>
+                  <a:srgbClr val="000000"/>
+                </a:solidFill>
+                <a:effectLst/>
+                <a:latin typeface="Times New Roman" panose="02020603050405020304" pitchFamily="18" charset="0"/>
+              </a:rPr>
+              <a:t>- Las páginas web y blogs distribuyen a través de los canales RSS las últimas actualizaciones de aquellos sitios son interés. A</a:t>
+            </a:r>
+            <a:r>
+              <a:rPr lang="es-ES" sz="1600" dirty="0">
+                <a:solidFill>
+                  <a:srgbClr val="000000"/>
+                </a:solidFill>
+                <a:latin typeface="Times New Roman" panose="02020603050405020304" pitchFamily="18" charset="0"/>
+              </a:rPr>
+              <a:t> </a:t>
+            </a:r>
+            <a:r>
+              <a:rPr lang="es-ES" sz="1600" b="0" i="0" dirty="0">
+                <a:solidFill>
+                  <a:srgbClr val="000000"/>
+                </a:solidFill>
+                <a:effectLst/>
+                <a:latin typeface="Times New Roman" panose="02020603050405020304" pitchFamily="18" charset="0"/>
+              </a:rPr>
+              <a:t>través de RSS podrás enterarte de las últimas noticias.</a:t>
+            </a:r>
+          </a:p>
+          <a:p>
+            <a:pPr algn="just"/>
+            <a:br>
+              <a:rPr lang="es-ES" sz="1600" b="0" i="0" dirty="0">
+                <a:solidFill>
+                  <a:srgbClr val="000000"/>
+                </a:solidFill>
+                <a:effectLst/>
+                <a:latin typeface="Times New Roman" panose="02020603050405020304" pitchFamily="18" charset="0"/>
+              </a:rPr>
+            </a:br>
+            <a:r>
+              <a:rPr lang="es-ES" sz="1600" b="0" i="0" dirty="0">
+                <a:solidFill>
+                  <a:srgbClr val="000000"/>
+                </a:solidFill>
+                <a:effectLst/>
+                <a:latin typeface="Times New Roman" panose="02020603050405020304" pitchFamily="18" charset="0"/>
+              </a:rPr>
+              <a:t>- La decisión está del lado del usuario ya que él es quien elige a qué páginas web suscribirse y cuando darse de baja de estas páginas web; El RSS supone un importante ahorro en el tiempo de navegación y búsqueda de información.</a:t>
+            </a:r>
+          </a:p>
+          <a:p>
+            <a:pPr marL="76200" indent="0" algn="just">
+              <a:buNone/>
+            </a:pPr>
+            <a:endParaRPr lang="es-ES" sz="1600" dirty="0">
+              <a:solidFill>
+                <a:srgbClr val="000000"/>
+              </a:solidFill>
+              <a:latin typeface="Times New Roman" panose="02020603050405020304" pitchFamily="18" charset="0"/>
+            </a:endParaRPr>
+          </a:p>
+          <a:p>
+            <a:r>
+              <a:rPr lang="es-ES" sz="1600" b="0" i="0" dirty="0">
+                <a:solidFill>
+                  <a:srgbClr val="000000"/>
+                </a:solidFill>
+                <a:effectLst/>
+                <a:latin typeface="Times New Roman" panose="02020603050405020304" pitchFamily="18" charset="0"/>
+              </a:rPr>
+              <a:t>- El RSS está libre de </a:t>
+            </a:r>
+            <a:r>
+              <a:rPr lang="es-ES" sz="1600" b="0" i="1" dirty="0">
+                <a:solidFill>
+                  <a:srgbClr val="000000"/>
+                </a:solidFill>
+                <a:effectLst/>
+                <a:latin typeface="Times New Roman" panose="02020603050405020304" pitchFamily="18" charset="0"/>
+              </a:rPr>
+              <a:t>SPAM</a:t>
+            </a:r>
+            <a:r>
+              <a:rPr lang="es-ES" sz="1600" b="0" i="0" dirty="0">
+                <a:solidFill>
+                  <a:srgbClr val="000000"/>
+                </a:solidFill>
+                <a:effectLst/>
+                <a:latin typeface="Times New Roman" panose="02020603050405020304" pitchFamily="18" charset="0"/>
+              </a:rPr>
+              <a:t>, porque no hay que dar la dirección de correo electrónico. Esto no ocurre con suscripciones por correo electrónico, en las que además de recibir noticias, es habitual recibir también </a:t>
+            </a:r>
+            <a:r>
+              <a:rPr lang="es-ES" sz="1600" b="0" i="1" dirty="0">
+                <a:solidFill>
+                  <a:srgbClr val="000000"/>
+                </a:solidFill>
+                <a:effectLst/>
+                <a:latin typeface="Times New Roman" panose="02020603050405020304" pitchFamily="18" charset="0"/>
+              </a:rPr>
+              <a:t>SPAM</a:t>
+            </a:r>
+            <a:r>
+              <a:rPr lang="es-ES" sz="1600" b="0" i="0" dirty="0">
+                <a:solidFill>
+                  <a:srgbClr val="000000"/>
+                </a:solidFill>
+                <a:effectLst/>
+                <a:latin typeface="Times New Roman" panose="02020603050405020304" pitchFamily="18" charset="0"/>
+              </a:rPr>
+              <a:t>. </a:t>
+            </a:r>
+            <a:br>
+              <a:rPr lang="es-ES" sz="1600" b="0" i="0" dirty="0">
+                <a:solidFill>
+                  <a:srgbClr val="000000"/>
+                </a:solidFill>
+                <a:effectLst/>
+                <a:latin typeface="Times New Roman" panose="02020603050405020304" pitchFamily="18" charset="0"/>
+              </a:rPr>
+            </a:br>
+            <a:br>
+              <a:rPr lang="es-ES" sz="1600" b="0" i="0" dirty="0">
+                <a:solidFill>
+                  <a:srgbClr val="000000"/>
+                </a:solidFill>
+                <a:effectLst/>
+                <a:latin typeface="Times New Roman" panose="02020603050405020304" pitchFamily="18" charset="0"/>
+              </a:rPr>
+            </a:br>
+            <a:r>
+              <a:rPr lang="es-ES" sz="1600" b="0" i="0" dirty="0">
+                <a:solidFill>
+                  <a:srgbClr val="000000"/>
+                </a:solidFill>
+                <a:effectLst/>
+                <a:latin typeface="Times New Roman" panose="02020603050405020304" pitchFamily="18" charset="0"/>
+              </a:rPr>
+              <a:t>- La cancelación de la suscripción a la página web será rápida y sencilla. </a:t>
+            </a:r>
+            <a:br>
+              <a:rPr lang="es-ES" sz="1600" b="0" i="0" dirty="0">
+                <a:solidFill>
+                  <a:srgbClr val="000000"/>
+                </a:solidFill>
+                <a:effectLst/>
+                <a:latin typeface="Times New Roman" panose="02020603050405020304" pitchFamily="18" charset="0"/>
+              </a:rPr>
+            </a:br>
+            <a:br>
+              <a:rPr lang="es-ES" sz="1600" b="0" i="0" dirty="0">
+                <a:solidFill>
+                  <a:srgbClr val="000000"/>
+                </a:solidFill>
+                <a:effectLst/>
+                <a:latin typeface="Times New Roman" panose="02020603050405020304" pitchFamily="18" charset="0"/>
+              </a:rPr>
+            </a:br>
+            <a:r>
+              <a:rPr lang="es-ES" sz="1600" b="0" i="0" dirty="0">
+                <a:solidFill>
+                  <a:srgbClr val="000000"/>
+                </a:solidFill>
+                <a:effectLst/>
+                <a:latin typeface="Times New Roman" panose="02020603050405020304" pitchFamily="18" charset="0"/>
+              </a:rPr>
+              <a:t>- Recibir las fuentes o Canales RSS de tus páginas web favoritas es totalmente gratuito. Tanto los contenidos como la mayoría de los programas (lectores RSS) que permiten leer las noticias RSS son gratuitos.</a:t>
+            </a:r>
+          </a:p>
+        </p:txBody>
+      </p:sp>
+      <p:sp>
+        <p:nvSpPr>
+          <p:cNvPr id="111" name="Google Shape;111;p16"/>
+          <p:cNvSpPr txBox="1">
+            <a:spLocks noGrp="1"/>
+          </p:cNvSpPr>
+          <p:nvPr>
+            <p:ph type="sldNum" idx="12"/>
+          </p:nvPr>
+        </p:nvSpPr>
+        <p:spPr>
+          <a:prstGeom prst="rect">
+            <a:avLst/>
+          </a:prstGeom>
+        </p:spPr>
+        <p:txBody>
+          <a:bodyPr spcFirstLastPara="1" wrap="square" lIns="91425" tIns="91425" rIns="91425" bIns="91425" anchor="t" anchorCtr="0">
+            <a:noAutofit/>
+          </a:bodyPr>
+          <a:lstStyle/>
+          <a:p>
+            <a:pPr marL="0" lvl="0" indent="0" algn="r" rtl="0">
+              <a:spcBef>
+                <a:spcPts val="0"/>
+              </a:spcBef>
+              <a:spcAft>
+                <a:spcPts val="0"/>
+              </a:spcAft>
+              <a:buNone/>
+            </a:pPr>
+            <a:fld id="{00000000-1234-1234-1234-123412341234}" type="slidenum">
+              <a:rPr lang="en"/>
+              <a:t>11</a:t>
+            </a:fld>
+            <a:endParaRPr/>
+          </a:p>
+        </p:txBody>
+      </p:sp>
+    </p:spTree>
+    <p:extLst>
+      <p:ext uri="{BB962C8B-B14F-4D97-AF65-F5344CB8AC3E}">
+        <p14:creationId xmlns:p14="http://schemas.microsoft.com/office/powerpoint/2010/main" val="351365064"/>
+      </p:ext>
+    </p:extLst>
+  </p:cSld>
+  <p:clrMapOvr>
+    <a:masterClrMapping/>
+  </p:clrMapOvr>
+</p:sld>
+</file>
+
+<file path=ppt/slides/slide12.xml><?xml version="1.0" encoding="utf-8"?>
+<p:sld xmlns:a="http://schemas.openxmlformats.org/drawingml/2006/main" xmlns:r="http://schemas.openxmlformats.org/officeDocument/2006/relationships" xmlns:p="http://schemas.openxmlformats.org/presentationml/2006/main">
+  <p:cSld>
+    <p:spTree>
+      <p:nvGrpSpPr>
+        <p:cNvPr id="1" name="Shape 108"/>
+        <p:cNvGrpSpPr/>
+        <p:nvPr/>
+      </p:nvGrpSpPr>
+      <p:grpSpPr>
+        <a:xfrm>
+          <a:off x="0" y="0"/>
+          <a:ext cx="0" cy="0"/>
+          <a:chOff x="0" y="0"/>
+          <a:chExt cx="0" cy="0"/>
+        </a:xfrm>
+      </p:grpSpPr>
+      <p:sp>
+        <p:nvSpPr>
+          <p:cNvPr id="109" name="Google Shape;109;p16"/>
+          <p:cNvSpPr txBox="1">
+            <a:spLocks noGrp="1"/>
+          </p:cNvSpPr>
+          <p:nvPr>
+            <p:ph type="title"/>
+          </p:nvPr>
+        </p:nvSpPr>
+        <p:spPr>
+          <a:xfrm>
+            <a:off x="293557" y="268186"/>
+            <a:ext cx="8229600" cy="413400"/>
+          </a:xfrm>
+          <a:prstGeom prst="rect">
+            <a:avLst/>
+          </a:prstGeom>
+        </p:spPr>
+        <p:txBody>
+          <a:bodyPr spcFirstLastPara="1" wrap="square" lIns="91425" tIns="91425" rIns="91425" bIns="91425" anchor="t" anchorCtr="0">
+            <a:noAutofit/>
+          </a:bodyPr>
+          <a:lstStyle/>
+          <a:p>
+            <a:pPr marL="0" lvl="0" indent="0" algn="l" rtl="0">
+              <a:spcBef>
+                <a:spcPts val="0"/>
+              </a:spcBef>
+              <a:spcAft>
+                <a:spcPts val="0"/>
+              </a:spcAft>
+              <a:buNone/>
+            </a:pPr>
+            <a:r>
+              <a:rPr lang="en" sz="3200" dirty="0"/>
+              <a:t>Beneficios</a:t>
+            </a:r>
+            <a:endParaRPr sz="3200" dirty="0"/>
+          </a:p>
+        </p:txBody>
+      </p:sp>
+      <p:sp>
+        <p:nvSpPr>
+          <p:cNvPr id="110" name="Google Shape;110;p16"/>
+          <p:cNvSpPr txBox="1">
+            <a:spLocks noGrp="1"/>
+          </p:cNvSpPr>
+          <p:nvPr>
+            <p:ph type="body" idx="1"/>
+          </p:nvPr>
+        </p:nvSpPr>
+        <p:spPr>
+          <a:xfrm>
+            <a:off x="-181621" y="823066"/>
+            <a:ext cx="9052464" cy="3964451"/>
+          </a:xfrm>
+          <a:prstGeom prst="rect">
+            <a:avLst/>
+          </a:prstGeom>
+        </p:spPr>
+        <p:txBody>
+          <a:bodyPr spcFirstLastPara="1" wrap="square" lIns="91425" tIns="91425" rIns="91425" bIns="91425" anchor="t" anchorCtr="0">
+            <a:noAutofit/>
+          </a:bodyPr>
+          <a:lstStyle/>
+          <a:p>
+            <a:pPr algn="just"/>
+            <a:br>
+              <a:rPr lang="es-ES" sz="1400" b="0" i="0" dirty="0">
+                <a:solidFill>
+                  <a:srgbClr val="000000"/>
+                </a:solidFill>
+                <a:effectLst/>
+                <a:latin typeface="Times New Roman" panose="02020603050405020304" pitchFamily="18" charset="0"/>
+              </a:rPr>
+            </a:br>
+            <a:r>
+              <a:rPr lang="es-ES" sz="1400" b="0" i="0" dirty="0">
+                <a:solidFill>
+                  <a:srgbClr val="000000"/>
+                </a:solidFill>
+                <a:effectLst/>
+                <a:latin typeface="Times New Roman" panose="02020603050405020304" pitchFamily="18" charset="0"/>
+              </a:rPr>
+              <a:t>- Las páginas web y blogs distribuyen a través de los canales RSS las últimas actualizaciones de aquellos sitios son interés. A</a:t>
+            </a:r>
+            <a:r>
+              <a:rPr lang="es-ES" sz="1400" dirty="0">
+                <a:solidFill>
+                  <a:srgbClr val="000000"/>
+                </a:solidFill>
+                <a:latin typeface="Times New Roman" panose="02020603050405020304" pitchFamily="18" charset="0"/>
+              </a:rPr>
+              <a:t> </a:t>
+            </a:r>
+            <a:r>
+              <a:rPr lang="es-ES" sz="1400" b="0" i="0" dirty="0">
+                <a:solidFill>
+                  <a:srgbClr val="000000"/>
+                </a:solidFill>
+                <a:effectLst/>
+                <a:latin typeface="Times New Roman" panose="02020603050405020304" pitchFamily="18" charset="0"/>
+              </a:rPr>
+              <a:t>través de RSS podrás enterarte de las últimas noticias.</a:t>
+            </a:r>
+          </a:p>
+          <a:p>
+            <a:pPr algn="just"/>
+            <a:br>
+              <a:rPr lang="es-ES" sz="1400" b="0" i="0" dirty="0">
+                <a:solidFill>
+                  <a:srgbClr val="000000"/>
+                </a:solidFill>
+                <a:effectLst/>
+                <a:latin typeface="Times New Roman" panose="02020603050405020304" pitchFamily="18" charset="0"/>
+              </a:rPr>
+            </a:br>
+            <a:r>
+              <a:rPr lang="es-ES" sz="1400" b="0" i="0" dirty="0">
+                <a:solidFill>
+                  <a:srgbClr val="000000"/>
+                </a:solidFill>
+                <a:effectLst/>
+                <a:latin typeface="Times New Roman" panose="02020603050405020304" pitchFamily="18" charset="0"/>
+              </a:rPr>
+              <a:t>- La decisión está del lado del usuario ya que él es quien elige a qué páginas web suscribirse y cuando darse de baja de estas páginas web; El RSS supone un importante ahorro en el tiempo de navegación y búsqueda de información.</a:t>
+            </a:r>
+          </a:p>
+          <a:p>
+            <a:pPr marL="76200" indent="0" algn="just">
+              <a:buNone/>
+            </a:pPr>
+            <a:endParaRPr lang="es-ES" sz="1400" dirty="0">
+              <a:solidFill>
+                <a:srgbClr val="000000"/>
+              </a:solidFill>
+              <a:latin typeface="Times New Roman" panose="02020603050405020304" pitchFamily="18" charset="0"/>
+            </a:endParaRPr>
+          </a:p>
+          <a:p>
+            <a:r>
+              <a:rPr lang="es-ES" sz="1400" b="0" i="0" dirty="0">
+                <a:solidFill>
+                  <a:srgbClr val="000000"/>
+                </a:solidFill>
+                <a:effectLst/>
+                <a:latin typeface="Times New Roman" panose="02020603050405020304" pitchFamily="18" charset="0"/>
+              </a:rPr>
+              <a:t>- El RSS está libre de </a:t>
+            </a:r>
+            <a:r>
+              <a:rPr lang="es-ES" sz="1400" b="0" i="1" dirty="0">
+                <a:solidFill>
+                  <a:srgbClr val="000000"/>
+                </a:solidFill>
+                <a:effectLst/>
+                <a:latin typeface="Times New Roman" panose="02020603050405020304" pitchFamily="18" charset="0"/>
+              </a:rPr>
+              <a:t>SPAM</a:t>
+            </a:r>
+            <a:r>
+              <a:rPr lang="es-ES" sz="1400" b="0" i="0" dirty="0">
+                <a:solidFill>
+                  <a:srgbClr val="000000"/>
+                </a:solidFill>
+                <a:effectLst/>
+                <a:latin typeface="Times New Roman" panose="02020603050405020304" pitchFamily="18" charset="0"/>
+              </a:rPr>
+              <a:t>, porque no hay que dar la dirección de correo electrónico. Esto no ocurre con suscripciones por correo electrónico, en las que además de recibir noticias, es habitual recibir también </a:t>
+            </a:r>
+            <a:r>
+              <a:rPr lang="es-ES" sz="1400" b="0" i="1" dirty="0">
+                <a:solidFill>
+                  <a:srgbClr val="000000"/>
+                </a:solidFill>
+                <a:effectLst/>
+                <a:latin typeface="Times New Roman" panose="02020603050405020304" pitchFamily="18" charset="0"/>
+              </a:rPr>
+              <a:t>SPAM</a:t>
+            </a:r>
+            <a:r>
+              <a:rPr lang="es-ES" sz="1400" b="0" i="0" dirty="0">
+                <a:solidFill>
+                  <a:srgbClr val="000000"/>
+                </a:solidFill>
+                <a:effectLst/>
+                <a:latin typeface="Times New Roman" panose="02020603050405020304" pitchFamily="18" charset="0"/>
+              </a:rPr>
+              <a:t>. </a:t>
+            </a:r>
+            <a:br>
+              <a:rPr lang="es-ES" sz="1400" b="0" i="0" dirty="0">
+                <a:solidFill>
+                  <a:srgbClr val="000000"/>
+                </a:solidFill>
+                <a:effectLst/>
+                <a:latin typeface="Times New Roman" panose="02020603050405020304" pitchFamily="18" charset="0"/>
+              </a:rPr>
+            </a:br>
+            <a:br>
+              <a:rPr lang="es-ES" sz="1400" b="0" i="0" dirty="0">
+                <a:solidFill>
+                  <a:srgbClr val="000000"/>
+                </a:solidFill>
+                <a:effectLst/>
+                <a:latin typeface="Times New Roman" panose="02020603050405020304" pitchFamily="18" charset="0"/>
+              </a:rPr>
+            </a:br>
+            <a:r>
+              <a:rPr lang="es-ES" sz="1400" b="0" i="0" dirty="0">
+                <a:solidFill>
+                  <a:srgbClr val="000000"/>
+                </a:solidFill>
+                <a:effectLst/>
+                <a:latin typeface="Times New Roman" panose="02020603050405020304" pitchFamily="18" charset="0"/>
+              </a:rPr>
+              <a:t>- La cancelación de la suscripción a la página web será rápida y sencilla. </a:t>
+            </a:r>
+            <a:br>
+              <a:rPr lang="es-ES" sz="1400" b="0" i="0" dirty="0">
+                <a:solidFill>
+                  <a:srgbClr val="000000"/>
+                </a:solidFill>
+                <a:effectLst/>
+                <a:latin typeface="Times New Roman" panose="02020603050405020304" pitchFamily="18" charset="0"/>
+              </a:rPr>
+            </a:br>
+            <a:br>
+              <a:rPr lang="es-ES" sz="1400" b="0" i="0" dirty="0">
+                <a:solidFill>
+                  <a:srgbClr val="000000"/>
+                </a:solidFill>
+                <a:effectLst/>
+                <a:latin typeface="Times New Roman" panose="02020603050405020304" pitchFamily="18" charset="0"/>
+              </a:rPr>
+            </a:br>
+            <a:r>
+              <a:rPr lang="es-ES" sz="1400" b="0" i="0" dirty="0">
+                <a:solidFill>
+                  <a:srgbClr val="000000"/>
+                </a:solidFill>
+                <a:effectLst/>
+                <a:latin typeface="Times New Roman" panose="02020603050405020304" pitchFamily="18" charset="0"/>
+              </a:rPr>
+              <a:t>- Recibir las fuentes o Canales RSS de tus páginas web favoritas es totalmente gratuito. Tanto los contenidos como la mayoría de los programas (lectores RSS) que permiten leer las noticias RSS son gratuitos.</a:t>
+            </a:r>
+          </a:p>
+        </p:txBody>
+      </p:sp>
+      <p:sp>
+        <p:nvSpPr>
+          <p:cNvPr id="111" name="Google Shape;111;p16"/>
+          <p:cNvSpPr txBox="1">
+            <a:spLocks noGrp="1"/>
+          </p:cNvSpPr>
+          <p:nvPr>
+            <p:ph type="sldNum" idx="12"/>
+          </p:nvPr>
+        </p:nvSpPr>
+        <p:spPr>
+          <a:prstGeom prst="rect">
+            <a:avLst/>
+          </a:prstGeom>
+        </p:spPr>
+        <p:txBody>
+          <a:bodyPr spcFirstLastPara="1" wrap="square" lIns="91425" tIns="91425" rIns="91425" bIns="91425" anchor="t" anchorCtr="0">
+            <a:noAutofit/>
+          </a:bodyPr>
+          <a:lstStyle/>
+          <a:p>
+            <a:pPr marL="0" lvl="0" indent="0" algn="r" rtl="0">
+              <a:spcBef>
+                <a:spcPts val="0"/>
+              </a:spcBef>
+              <a:spcAft>
+                <a:spcPts val="0"/>
+              </a:spcAft>
+              <a:buNone/>
+            </a:pPr>
+            <a:fld id="{00000000-1234-1234-1234-123412341234}" type="slidenum">
+              <a:rPr lang="en"/>
+              <a:t>12</a:t>
+            </a:fld>
+            <a:endParaRPr/>
+          </a:p>
+        </p:txBody>
+      </p:sp>
+    </p:spTree>
+    <p:extLst>
+      <p:ext uri="{BB962C8B-B14F-4D97-AF65-F5344CB8AC3E}">
+        <p14:creationId xmlns:p14="http://schemas.microsoft.com/office/powerpoint/2010/main" val="29937446"/>
+      </p:ext>
+    </p:extLst>
+  </p:cSld>
+  <p:clrMapOvr>
+    <a:masterClrMapping/>
+  </p:clrMapOvr>
+</p:sld>
+</file>
+
+<file path=ppt/slides/slide13.xml><?xml version="1.0" encoding="utf-8"?>
+<p:sld xmlns:a="http://schemas.openxmlformats.org/drawingml/2006/main" xmlns:r="http://schemas.openxmlformats.org/officeDocument/2006/relationships" xmlns:p="http://schemas.openxmlformats.org/presentationml/2006/main">
+  <p:cSld>
+    <p:spTree>
+      <p:nvGrpSpPr>
+        <p:cNvPr id="1" name="Shape 108"/>
+        <p:cNvGrpSpPr/>
+        <p:nvPr/>
+      </p:nvGrpSpPr>
+      <p:grpSpPr>
+        <a:xfrm>
+          <a:off x="0" y="0"/>
+          <a:ext cx="0" cy="0"/>
+          <a:chOff x="0" y="0"/>
+          <a:chExt cx="0" cy="0"/>
+        </a:xfrm>
+      </p:grpSpPr>
+      <p:sp>
+        <p:nvSpPr>
+          <p:cNvPr id="109" name="Google Shape;109;p16"/>
+          <p:cNvSpPr txBox="1">
+            <a:spLocks noGrp="1"/>
+          </p:cNvSpPr>
+          <p:nvPr>
+            <p:ph type="title"/>
+          </p:nvPr>
+        </p:nvSpPr>
+        <p:spPr>
+          <a:xfrm>
+            <a:off x="222673" y="587163"/>
+            <a:ext cx="8229600" cy="413400"/>
+          </a:xfrm>
+          <a:prstGeom prst="rect">
+            <a:avLst/>
+          </a:prstGeom>
+        </p:spPr>
+        <p:txBody>
+          <a:bodyPr spcFirstLastPara="1" wrap="square" lIns="91425" tIns="91425" rIns="91425" bIns="91425" anchor="t" anchorCtr="0">
+            <a:noAutofit/>
+          </a:bodyPr>
+          <a:lstStyle/>
+          <a:p>
+            <a:pPr marL="0" lvl="0" indent="0" algn="l" rtl="0">
+              <a:spcBef>
+                <a:spcPts val="0"/>
+              </a:spcBef>
+              <a:spcAft>
+                <a:spcPts val="0"/>
+              </a:spcAft>
+              <a:buNone/>
+            </a:pPr>
+            <a:r>
+              <a:rPr lang="en" sz="3200" dirty="0"/>
+              <a:t>Última versión de RSS</a:t>
+            </a:r>
+            <a:endParaRPr sz="3200" dirty="0"/>
+          </a:p>
+        </p:txBody>
+      </p:sp>
+      <p:sp>
+        <p:nvSpPr>
+          <p:cNvPr id="110" name="Google Shape;110;p16"/>
+          <p:cNvSpPr txBox="1">
+            <a:spLocks noGrp="1"/>
+          </p:cNvSpPr>
+          <p:nvPr>
+            <p:ph type="body" idx="1"/>
+          </p:nvPr>
+        </p:nvSpPr>
+        <p:spPr>
+          <a:xfrm>
+            <a:off x="-68207" y="1943029"/>
+            <a:ext cx="9052464" cy="3964451"/>
+          </a:xfrm>
+          <a:prstGeom prst="rect">
+            <a:avLst/>
+          </a:prstGeom>
+        </p:spPr>
+        <p:txBody>
+          <a:bodyPr spcFirstLastPara="1" wrap="square" lIns="91425" tIns="91425" rIns="91425" bIns="91425" anchor="t" anchorCtr="0">
+            <a:noAutofit/>
+          </a:bodyPr>
+          <a:lstStyle/>
+          <a:p>
+            <a:pPr algn="just"/>
+            <a:r>
+              <a:rPr lang="es-ES" sz="1600" b="0" i="0" dirty="0">
+                <a:solidFill>
+                  <a:srgbClr val="202124"/>
+                </a:solidFill>
+                <a:effectLst/>
+                <a:latin typeface="arial" panose="020B0604020202020204" pitchFamily="34" charset="0"/>
+              </a:rPr>
+              <a:t>El sistema </a:t>
+            </a:r>
+            <a:r>
+              <a:rPr lang="es-ES" sz="1600" b="1" i="0" dirty="0">
+                <a:solidFill>
+                  <a:srgbClr val="202124"/>
+                </a:solidFill>
+                <a:effectLst/>
+                <a:latin typeface="arial" panose="020B0604020202020204" pitchFamily="34" charset="0"/>
+              </a:rPr>
+              <a:t>RSS</a:t>
+            </a:r>
+            <a:r>
+              <a:rPr lang="es-ES" sz="1600" b="0" i="0" dirty="0">
+                <a:solidFill>
+                  <a:srgbClr val="202124"/>
+                </a:solidFill>
+                <a:effectLst/>
+                <a:latin typeface="arial" panose="020B0604020202020204" pitchFamily="34" charset="0"/>
+              </a:rPr>
+              <a:t> está actualmente en la </a:t>
+            </a:r>
+            <a:r>
+              <a:rPr lang="es-ES" sz="1600" b="1" i="0" dirty="0">
+                <a:solidFill>
+                  <a:srgbClr val="202124"/>
+                </a:solidFill>
+                <a:effectLst/>
+                <a:latin typeface="arial" panose="020B0604020202020204" pitchFamily="34" charset="0"/>
+              </a:rPr>
+              <a:t>versión</a:t>
+            </a:r>
+            <a:r>
+              <a:rPr lang="es-ES" sz="1600" b="0" i="0" dirty="0">
+                <a:solidFill>
+                  <a:srgbClr val="202124"/>
+                </a:solidFill>
+                <a:effectLst/>
+                <a:latin typeface="arial" panose="020B0604020202020204" pitchFamily="34" charset="0"/>
+              </a:rPr>
+              <a:t> 2.0, y el acrónimo es una abreviatura del término </a:t>
+            </a:r>
+            <a:r>
+              <a:rPr lang="es-ES" sz="1600" b="0" i="0" dirty="0" err="1">
+                <a:solidFill>
+                  <a:srgbClr val="202124"/>
+                </a:solidFill>
+                <a:effectLst/>
+                <a:latin typeface="arial" panose="020B0604020202020204" pitchFamily="34" charset="0"/>
+              </a:rPr>
+              <a:t>Really</a:t>
+            </a:r>
+            <a:r>
+              <a:rPr lang="es-ES" sz="1600" b="0" i="0" dirty="0">
+                <a:solidFill>
+                  <a:srgbClr val="202124"/>
+                </a:solidFill>
+                <a:effectLst/>
+                <a:latin typeface="arial" panose="020B0604020202020204" pitchFamily="34" charset="0"/>
+              </a:rPr>
+              <a:t> Simple </a:t>
+            </a:r>
+            <a:r>
+              <a:rPr lang="es-ES" sz="1600" b="0" i="0" dirty="0" err="1">
+                <a:solidFill>
+                  <a:srgbClr val="202124"/>
+                </a:solidFill>
+                <a:effectLst/>
+                <a:latin typeface="arial" panose="020B0604020202020204" pitchFamily="34" charset="0"/>
+              </a:rPr>
+              <a:t>Syndication</a:t>
+            </a:r>
+            <a:r>
+              <a:rPr lang="es-ES" sz="1600" b="0" i="0" dirty="0">
+                <a:solidFill>
+                  <a:srgbClr val="202124"/>
+                </a:solidFill>
+                <a:effectLst/>
+                <a:latin typeface="arial" panose="020B0604020202020204" pitchFamily="34" charset="0"/>
+              </a:rPr>
+              <a:t> (algo como "distribución muy simple"). Sus </a:t>
+            </a:r>
+            <a:r>
+              <a:rPr lang="es-ES" sz="1600" b="1" i="0" dirty="0">
+                <a:solidFill>
+                  <a:srgbClr val="202124"/>
+                </a:solidFill>
+                <a:effectLst/>
+                <a:latin typeface="arial" panose="020B0604020202020204" pitchFamily="34" charset="0"/>
+              </a:rPr>
+              <a:t>versiones</a:t>
+            </a:r>
+            <a:r>
+              <a:rPr lang="es-ES" sz="1600" b="0" i="0" dirty="0">
+                <a:solidFill>
+                  <a:srgbClr val="202124"/>
+                </a:solidFill>
+                <a:effectLst/>
+                <a:latin typeface="arial" panose="020B0604020202020204" pitchFamily="34" charset="0"/>
+              </a:rPr>
+              <a:t> anteriores se llamaban </a:t>
+            </a:r>
+            <a:r>
+              <a:rPr lang="es-ES" sz="1600" b="0" i="0" dirty="0" err="1">
+                <a:solidFill>
+                  <a:srgbClr val="202124"/>
+                </a:solidFill>
+                <a:effectLst/>
+                <a:latin typeface="arial" panose="020B0604020202020204" pitchFamily="34" charset="0"/>
+              </a:rPr>
+              <a:t>Rich</a:t>
+            </a:r>
+            <a:r>
+              <a:rPr lang="es-ES" sz="1600" b="0" i="0" dirty="0">
+                <a:solidFill>
+                  <a:srgbClr val="202124"/>
+                </a:solidFill>
+                <a:effectLst/>
+                <a:latin typeface="arial" panose="020B0604020202020204" pitchFamily="34" charset="0"/>
+              </a:rPr>
+              <a:t> Site </a:t>
+            </a:r>
+            <a:r>
+              <a:rPr lang="es-ES" sz="1600" b="0" i="0" dirty="0" err="1">
+                <a:solidFill>
+                  <a:srgbClr val="202124"/>
+                </a:solidFill>
+                <a:effectLst/>
+                <a:latin typeface="arial" panose="020B0604020202020204" pitchFamily="34" charset="0"/>
+              </a:rPr>
+              <a:t>Summary</a:t>
+            </a:r>
+            <a:r>
+              <a:rPr lang="es-ES" sz="1600" b="0" i="0" dirty="0">
+                <a:solidFill>
+                  <a:srgbClr val="202124"/>
+                </a:solidFill>
+                <a:effectLst/>
+                <a:latin typeface="arial" panose="020B0604020202020204" pitchFamily="34" charset="0"/>
+              </a:rPr>
+              <a:t> (</a:t>
+            </a:r>
+            <a:r>
+              <a:rPr lang="es-ES" sz="1600" b="1" i="0" dirty="0">
+                <a:solidFill>
+                  <a:srgbClr val="202124"/>
+                </a:solidFill>
+                <a:effectLst/>
+                <a:latin typeface="arial" panose="020B0604020202020204" pitchFamily="34" charset="0"/>
+              </a:rPr>
+              <a:t>RSS</a:t>
+            </a:r>
+            <a:r>
+              <a:rPr lang="es-ES" sz="1600" b="0" i="0" dirty="0">
+                <a:solidFill>
+                  <a:srgbClr val="202124"/>
+                </a:solidFill>
+                <a:effectLst/>
+                <a:latin typeface="arial" panose="020B0604020202020204" pitchFamily="34" charset="0"/>
+              </a:rPr>
+              <a:t> 0.91) y RDF Site </a:t>
+            </a:r>
+            <a:r>
+              <a:rPr lang="es-ES" sz="1600" b="0" i="0" dirty="0" err="1">
+                <a:solidFill>
+                  <a:srgbClr val="202124"/>
+                </a:solidFill>
+                <a:effectLst/>
+                <a:latin typeface="arial" panose="020B0604020202020204" pitchFamily="34" charset="0"/>
+              </a:rPr>
+              <a:t>Summary</a:t>
+            </a:r>
+            <a:r>
+              <a:rPr lang="es-ES" sz="1600" b="0" i="0" dirty="0">
+                <a:solidFill>
+                  <a:srgbClr val="202124"/>
+                </a:solidFill>
+                <a:effectLst/>
+                <a:latin typeface="arial" panose="020B0604020202020204" pitchFamily="34" charset="0"/>
+              </a:rPr>
+              <a:t> (</a:t>
+            </a:r>
+            <a:r>
+              <a:rPr lang="es-ES" sz="1600" b="1" i="0" dirty="0">
+                <a:solidFill>
+                  <a:srgbClr val="202124"/>
+                </a:solidFill>
+                <a:effectLst/>
+                <a:latin typeface="arial" panose="020B0604020202020204" pitchFamily="34" charset="0"/>
+              </a:rPr>
+              <a:t>RSS</a:t>
+            </a:r>
+            <a:r>
+              <a:rPr lang="es-ES" sz="1600" b="0" i="0" dirty="0">
+                <a:solidFill>
+                  <a:srgbClr val="202124"/>
+                </a:solidFill>
+                <a:effectLst/>
+                <a:latin typeface="arial" panose="020B0604020202020204" pitchFamily="34" charset="0"/>
+              </a:rPr>
+              <a:t> 0.9 y 1.0).</a:t>
+            </a:r>
+            <a:endParaRPr lang="es-ES" sz="1600" b="0" i="0" dirty="0">
+              <a:solidFill>
+                <a:srgbClr val="000000"/>
+              </a:solidFill>
+              <a:effectLst/>
+              <a:latin typeface="Times New Roman" panose="02020603050405020304" pitchFamily="18" charset="0"/>
+            </a:endParaRPr>
+          </a:p>
+        </p:txBody>
+      </p:sp>
+      <p:sp>
+        <p:nvSpPr>
+          <p:cNvPr id="111" name="Google Shape;111;p16"/>
+          <p:cNvSpPr txBox="1">
+            <a:spLocks noGrp="1"/>
+          </p:cNvSpPr>
+          <p:nvPr>
+            <p:ph type="sldNum" idx="12"/>
+          </p:nvPr>
+        </p:nvSpPr>
+        <p:spPr>
+          <a:prstGeom prst="rect">
+            <a:avLst/>
+          </a:prstGeom>
+        </p:spPr>
+        <p:txBody>
+          <a:bodyPr spcFirstLastPara="1" wrap="square" lIns="91425" tIns="91425" rIns="91425" bIns="91425" anchor="t" anchorCtr="0">
+            <a:noAutofit/>
+          </a:bodyPr>
+          <a:lstStyle/>
+          <a:p>
+            <a:pPr marL="0" lvl="0" indent="0" algn="r" rtl="0">
+              <a:spcBef>
+                <a:spcPts val="0"/>
+              </a:spcBef>
+              <a:spcAft>
+                <a:spcPts val="0"/>
+              </a:spcAft>
+              <a:buNone/>
+            </a:pPr>
+            <a:fld id="{00000000-1234-1234-1234-123412341234}" type="slidenum">
+              <a:rPr lang="en"/>
+              <a:t>13</a:t>
+            </a:fld>
+            <a:endParaRPr/>
+          </a:p>
+        </p:txBody>
+      </p:sp>
+    </p:spTree>
+    <p:extLst>
+      <p:ext uri="{BB962C8B-B14F-4D97-AF65-F5344CB8AC3E}">
+        <p14:creationId xmlns:p14="http://schemas.microsoft.com/office/powerpoint/2010/main" val="103421763"/>
+      </p:ext>
+    </p:extLst>
   </p:cSld>
   <p:clrMapOvr>
     <a:masterClrMapping/>
@@ -6424,6 +8228,310 @@
     <p:extLst>
       <p:ext uri="{BB962C8B-B14F-4D97-AF65-F5344CB8AC3E}">
         <p14:creationId xmlns:p14="http://schemas.microsoft.com/office/powerpoint/2010/main" val="3041772228"/>
+      </p:ext>
+    </p:extLst>
+  </p:cSld>
+  <p:clrMapOvr>
+    <a:masterClrMapping/>
+  </p:clrMapOvr>
+</p:sld>
+</file>
+
+<file path=ppt/slides/slide8.xml><?xml version="1.0" encoding="utf-8"?>
+<p:sld xmlns:a="http://schemas.openxmlformats.org/drawingml/2006/main" xmlns:r="http://schemas.openxmlformats.org/officeDocument/2006/relationships" xmlns:p="http://schemas.openxmlformats.org/presentationml/2006/main">
+  <p:cSld>
+    <p:spTree>
+      <p:nvGrpSpPr>
+        <p:cNvPr id="1" name="Shape 64"/>
+        <p:cNvGrpSpPr/>
+        <p:nvPr/>
+      </p:nvGrpSpPr>
+      <p:grpSpPr>
+        <a:xfrm>
+          <a:off x="0" y="0"/>
+          <a:ext cx="0" cy="0"/>
+          <a:chOff x="0" y="0"/>
+          <a:chExt cx="0" cy="0"/>
+        </a:xfrm>
+      </p:grpSpPr>
+      <p:sp>
+        <p:nvSpPr>
+          <p:cNvPr id="65" name="Google Shape;65;p11"/>
+          <p:cNvSpPr txBox="1">
+            <a:spLocks noGrp="1"/>
+          </p:cNvSpPr>
+          <p:nvPr>
+            <p:ph type="ctrTitle"/>
+          </p:nvPr>
+        </p:nvSpPr>
+        <p:spPr>
+          <a:xfrm>
+            <a:off x="968315" y="2775987"/>
+            <a:ext cx="7212600" cy="1008838"/>
+          </a:xfrm>
+          <a:prstGeom prst="rect">
+            <a:avLst/>
+          </a:prstGeom>
+        </p:spPr>
+        <p:txBody>
+          <a:bodyPr spcFirstLastPara="1" wrap="square" lIns="91425" tIns="91425" rIns="91425" bIns="91425" anchor="b" anchorCtr="0">
+            <a:noAutofit/>
+          </a:bodyPr>
+          <a:lstStyle/>
+          <a:p>
+            <a:r>
+              <a:rPr lang="en" dirty="0"/>
+              <a:t>¿QUÉ ES RSS?</a:t>
+            </a:r>
+          </a:p>
+        </p:txBody>
+      </p:sp>
+    </p:spTree>
+    <p:extLst>
+      <p:ext uri="{BB962C8B-B14F-4D97-AF65-F5344CB8AC3E}">
+        <p14:creationId xmlns:p14="http://schemas.microsoft.com/office/powerpoint/2010/main" val="2780623146"/>
+      </p:ext>
+    </p:extLst>
+  </p:cSld>
+  <p:clrMapOvr>
+    <a:masterClrMapping/>
+  </p:clrMapOvr>
+</p:sld>
+</file>
+
+<file path=ppt/slides/slide9.xml><?xml version="1.0" encoding="utf-8"?>
+<p:sld xmlns:a="http://schemas.openxmlformats.org/drawingml/2006/main" xmlns:r="http://schemas.openxmlformats.org/officeDocument/2006/relationships" xmlns:p="http://schemas.openxmlformats.org/presentationml/2006/main">
+  <p:cSld>
+    <p:spTree>
+      <p:nvGrpSpPr>
+        <p:cNvPr id="1" name="Shape 108"/>
+        <p:cNvGrpSpPr/>
+        <p:nvPr/>
+      </p:nvGrpSpPr>
+      <p:grpSpPr>
+        <a:xfrm>
+          <a:off x="0" y="0"/>
+          <a:ext cx="0" cy="0"/>
+          <a:chOff x="0" y="0"/>
+          <a:chExt cx="0" cy="0"/>
+        </a:xfrm>
+      </p:grpSpPr>
+      <p:sp>
+        <p:nvSpPr>
+          <p:cNvPr id="109" name="Google Shape;109;p16"/>
+          <p:cNvSpPr txBox="1">
+            <a:spLocks noGrp="1"/>
+          </p:cNvSpPr>
+          <p:nvPr>
+            <p:ph type="title"/>
+          </p:nvPr>
+        </p:nvSpPr>
+        <p:spPr>
+          <a:xfrm>
+            <a:off x="343225" y="436861"/>
+            <a:ext cx="8229600" cy="413400"/>
+          </a:xfrm>
+          <a:prstGeom prst="rect">
+            <a:avLst/>
+          </a:prstGeom>
+        </p:spPr>
+        <p:txBody>
+          <a:bodyPr spcFirstLastPara="1" wrap="square" lIns="91425" tIns="91425" rIns="91425" bIns="91425" anchor="t" anchorCtr="0">
+            <a:noAutofit/>
+          </a:bodyPr>
+          <a:lstStyle/>
+          <a:p>
+            <a:pPr marL="0" lvl="0" indent="0" algn="l" rtl="0">
+              <a:spcBef>
+                <a:spcPts val="0"/>
+              </a:spcBef>
+              <a:spcAft>
+                <a:spcPts val="0"/>
+              </a:spcAft>
+              <a:buNone/>
+            </a:pPr>
+            <a:r>
+              <a:rPr lang="en" sz="3200" dirty="0"/>
+              <a:t>RSS</a:t>
+            </a:r>
+            <a:endParaRPr sz="3200" dirty="0"/>
+          </a:p>
+        </p:txBody>
+      </p:sp>
+      <p:sp>
+        <p:nvSpPr>
+          <p:cNvPr id="110" name="Google Shape;110;p16"/>
+          <p:cNvSpPr txBox="1">
+            <a:spLocks noGrp="1"/>
+          </p:cNvSpPr>
+          <p:nvPr>
+            <p:ph type="body" idx="1"/>
+          </p:nvPr>
+        </p:nvSpPr>
+        <p:spPr>
+          <a:xfrm>
+            <a:off x="251484" y="1179049"/>
+            <a:ext cx="8641032" cy="3964451"/>
+          </a:xfrm>
+          <a:prstGeom prst="rect">
+            <a:avLst/>
+          </a:prstGeom>
+        </p:spPr>
+        <p:txBody>
+          <a:bodyPr spcFirstLastPara="1" wrap="square" lIns="91425" tIns="91425" rIns="91425" bIns="91425" anchor="t" anchorCtr="0">
+            <a:noAutofit/>
+          </a:bodyPr>
+          <a:lstStyle/>
+          <a:p>
+            <a:pPr marL="76200" indent="0">
+              <a:buNone/>
+            </a:pPr>
+            <a:r>
+              <a:rPr lang="es-ES" b="1" i="0" dirty="0">
+                <a:solidFill>
+                  <a:srgbClr val="000000"/>
+                </a:solidFill>
+                <a:effectLst/>
+                <a:latin typeface="Times New Roman" panose="02020603050405020304" pitchFamily="18" charset="0"/>
+              </a:rPr>
+              <a:t>RSS</a:t>
+            </a:r>
+            <a:r>
+              <a:rPr lang="es-ES" b="0" i="0" dirty="0">
+                <a:solidFill>
+                  <a:srgbClr val="000000"/>
+                </a:solidFill>
+                <a:effectLst/>
+                <a:latin typeface="Times New Roman" panose="02020603050405020304" pitchFamily="18" charset="0"/>
+              </a:rPr>
+              <a:t> son las siglas de </a:t>
+            </a:r>
+            <a:r>
+              <a:rPr lang="es-ES" b="0" i="1" dirty="0" err="1">
+                <a:solidFill>
+                  <a:srgbClr val="000000"/>
+                </a:solidFill>
+                <a:effectLst/>
+                <a:latin typeface="Times New Roman" panose="02020603050405020304" pitchFamily="18" charset="0"/>
+              </a:rPr>
+              <a:t>Really</a:t>
+            </a:r>
+            <a:r>
+              <a:rPr lang="es-ES" b="0" i="1" dirty="0">
+                <a:solidFill>
+                  <a:srgbClr val="000000"/>
+                </a:solidFill>
+                <a:effectLst/>
+                <a:latin typeface="Times New Roman" panose="02020603050405020304" pitchFamily="18" charset="0"/>
+              </a:rPr>
+              <a:t> Simple </a:t>
+            </a:r>
+            <a:r>
+              <a:rPr lang="es-ES" b="0" i="1" dirty="0" err="1">
+                <a:solidFill>
+                  <a:srgbClr val="000000"/>
+                </a:solidFill>
+                <a:effectLst/>
+                <a:latin typeface="Times New Roman" panose="02020603050405020304" pitchFamily="18" charset="0"/>
+              </a:rPr>
+              <a:t>Syndication</a:t>
+            </a:r>
+            <a:r>
+              <a:rPr lang="es-ES" b="0" i="0" dirty="0">
+                <a:solidFill>
+                  <a:srgbClr val="000000"/>
+                </a:solidFill>
+                <a:effectLst/>
+                <a:latin typeface="Times New Roman" panose="02020603050405020304" pitchFamily="18" charset="0"/>
+              </a:rPr>
+              <a:t>, un formato que cumple con el estándar XML para compartir contenido en la web. Se utiliza para </a:t>
+            </a:r>
+            <a:r>
+              <a:rPr lang="es-ES" b="1" i="0" dirty="0">
+                <a:solidFill>
+                  <a:srgbClr val="000000"/>
+                </a:solidFill>
+                <a:effectLst/>
+                <a:latin typeface="Times New Roman" panose="02020603050405020304" pitchFamily="18" charset="0"/>
+              </a:rPr>
+              <a:t>difundir información actualizada a usuarios que se han suscrito </a:t>
+            </a:r>
+            <a:r>
+              <a:rPr lang="es-ES" b="0" i="0" dirty="0">
+                <a:solidFill>
+                  <a:srgbClr val="000000"/>
+                </a:solidFill>
+                <a:effectLst/>
+                <a:latin typeface="Times New Roman" panose="02020603050405020304" pitchFamily="18" charset="0"/>
+              </a:rPr>
+              <a:t>a una fuente de contenidos. El formato permite distribuir contenidos sin necesidad de un navegador, utilizando un </a:t>
+            </a:r>
+            <a:r>
+              <a:rPr lang="es-ES" b="0" i="1" dirty="0">
+                <a:solidFill>
+                  <a:srgbClr val="000000"/>
+                </a:solidFill>
+                <a:effectLst/>
+                <a:latin typeface="Times New Roman" panose="02020603050405020304" pitchFamily="18" charset="0"/>
+              </a:rPr>
+              <a:t>software</a:t>
+            </a:r>
+            <a:r>
+              <a:rPr lang="es-ES" b="0" i="0" dirty="0">
+                <a:solidFill>
+                  <a:srgbClr val="000000"/>
+                </a:solidFill>
+                <a:effectLst/>
+                <a:latin typeface="Times New Roman" panose="02020603050405020304" pitchFamily="18" charset="0"/>
+              </a:rPr>
+              <a:t> diseñado para leer estos contenidos RSS (agregador). También es posible utilizar el navegador de internet para visualizar los contenidos RSS. </a:t>
+            </a:r>
+            <a:endParaRPr lang="en" dirty="0"/>
+          </a:p>
+        </p:txBody>
+      </p:sp>
+      <p:sp>
+        <p:nvSpPr>
+          <p:cNvPr id="111" name="Google Shape;111;p16"/>
+          <p:cNvSpPr txBox="1">
+            <a:spLocks noGrp="1"/>
+          </p:cNvSpPr>
+          <p:nvPr>
+            <p:ph type="sldNum" idx="12"/>
+          </p:nvPr>
+        </p:nvSpPr>
+        <p:spPr>
+          <a:prstGeom prst="rect">
+            <a:avLst/>
+          </a:prstGeom>
+        </p:spPr>
+        <p:txBody>
+          <a:bodyPr spcFirstLastPara="1" wrap="square" lIns="91425" tIns="91425" rIns="91425" bIns="91425" anchor="t" anchorCtr="0">
+            <a:noAutofit/>
+          </a:bodyPr>
+          <a:lstStyle/>
+          <a:p>
+            <a:pPr marL="0" lvl="0" indent="0" algn="r" rtl="0">
+              <a:spcBef>
+                <a:spcPts val="0"/>
+              </a:spcBef>
+              <a:spcAft>
+                <a:spcPts val="0"/>
+              </a:spcAft>
+              <a:buNone/>
+            </a:pPr>
+            <a:fld id="{00000000-1234-1234-1234-123412341234}" type="slidenum">
+              <a:rPr lang="en"/>
+              <a:t>9</a:t>
+            </a:fld>
+            <a:endParaRPr/>
+          </a:p>
+        </p:txBody>
+      </p:sp>
+    </p:spTree>
+    <p:extLst>
+      <p:ext uri="{BB962C8B-B14F-4D97-AF65-F5344CB8AC3E}">
+        <p14:creationId xmlns:p14="http://schemas.microsoft.com/office/powerpoint/2010/main" val="3648900479"/>
       </p:ext>
     </p:extLst>
   </p:cSld>

</xml_diff>